<commit_message>
Add Hackathon presentation pptx file
</commit_message>
<xml_diff>
--- a/docs/해커톤 대회.pptx
+++ b/docs/해커톤 대회.pptx
@@ -107,6 +107,11 @@
       </a:defRPr>
     </a:lvl9pPr>
   </p:defaultTextStyle>
+  <p:extLst>
+    <p:ext uri="{EFAFB233-063F-42B5-8137-9DF3F51BA10A}">
+      <p15:sldGuideLst xmlns:p15="http://schemas.microsoft.com/office/powerpoint/2012/main"/>
+    </p:ext>
+  </p:extLst>
 </p:presentation>
 </file>
 
@@ -257,7 +262,7 @@
           <a:p>
             <a:fld id="{BE516E25-678F-BC4C-A6D5-74022B6D308B}" type="datetimeFigureOut">
               <a:rPr kumimoji="1" lang="ko-KR" altLang="en-US" smtClean="0"/>
-              <a:t>2025. 7. 21.</a:t>
+              <a:t>2025. 7. 25.</a:t>
             </a:fld>
             <a:endParaRPr kumimoji="1" lang="ko-KR" altLang="en-US"/>
           </a:p>
@@ -455,7 +460,7 @@
           <a:p>
             <a:fld id="{BE516E25-678F-BC4C-A6D5-74022B6D308B}" type="datetimeFigureOut">
               <a:rPr kumimoji="1" lang="ko-KR" altLang="en-US" smtClean="0"/>
-              <a:t>2025. 7. 21.</a:t>
+              <a:t>2025. 7. 25.</a:t>
             </a:fld>
             <a:endParaRPr kumimoji="1" lang="ko-KR" altLang="en-US"/>
           </a:p>
@@ -663,7 +668,7 @@
           <a:p>
             <a:fld id="{BE516E25-678F-BC4C-A6D5-74022B6D308B}" type="datetimeFigureOut">
               <a:rPr kumimoji="1" lang="ko-KR" altLang="en-US" smtClean="0"/>
-              <a:t>2025. 7. 21.</a:t>
+              <a:t>2025. 7. 25.</a:t>
             </a:fld>
             <a:endParaRPr kumimoji="1" lang="ko-KR" altLang="en-US"/>
           </a:p>
@@ -861,7 +866,7 @@
           <a:p>
             <a:fld id="{BE516E25-678F-BC4C-A6D5-74022B6D308B}" type="datetimeFigureOut">
               <a:rPr kumimoji="1" lang="ko-KR" altLang="en-US" smtClean="0"/>
-              <a:t>2025. 7. 21.</a:t>
+              <a:t>2025. 7. 25.</a:t>
             </a:fld>
             <a:endParaRPr kumimoji="1" lang="ko-KR" altLang="en-US"/>
           </a:p>
@@ -1136,7 +1141,7 @@
           <a:p>
             <a:fld id="{BE516E25-678F-BC4C-A6D5-74022B6D308B}" type="datetimeFigureOut">
               <a:rPr kumimoji="1" lang="ko-KR" altLang="en-US" smtClean="0"/>
-              <a:t>2025. 7. 21.</a:t>
+              <a:t>2025. 7. 25.</a:t>
             </a:fld>
             <a:endParaRPr kumimoji="1" lang="ko-KR" altLang="en-US"/>
           </a:p>
@@ -1401,7 +1406,7 @@
           <a:p>
             <a:fld id="{BE516E25-678F-BC4C-A6D5-74022B6D308B}" type="datetimeFigureOut">
               <a:rPr kumimoji="1" lang="ko-KR" altLang="en-US" smtClean="0"/>
-              <a:t>2025. 7. 21.</a:t>
+              <a:t>2025. 7. 25.</a:t>
             </a:fld>
             <a:endParaRPr kumimoji="1" lang="ko-KR" altLang="en-US"/>
           </a:p>
@@ -1813,7 +1818,7 @@
           <a:p>
             <a:fld id="{BE516E25-678F-BC4C-A6D5-74022B6D308B}" type="datetimeFigureOut">
               <a:rPr kumimoji="1" lang="ko-KR" altLang="en-US" smtClean="0"/>
-              <a:t>2025. 7. 21.</a:t>
+              <a:t>2025. 7. 25.</a:t>
             </a:fld>
             <a:endParaRPr kumimoji="1" lang="ko-KR" altLang="en-US"/>
           </a:p>
@@ -1954,7 +1959,7 @@
           <a:p>
             <a:fld id="{BE516E25-678F-BC4C-A6D5-74022B6D308B}" type="datetimeFigureOut">
               <a:rPr kumimoji="1" lang="ko-KR" altLang="en-US" smtClean="0"/>
-              <a:t>2025. 7. 21.</a:t>
+              <a:t>2025. 7. 25.</a:t>
             </a:fld>
             <a:endParaRPr kumimoji="1" lang="ko-KR" altLang="en-US"/>
           </a:p>
@@ -2067,7 +2072,7 @@
           <a:p>
             <a:fld id="{BE516E25-678F-BC4C-A6D5-74022B6D308B}" type="datetimeFigureOut">
               <a:rPr kumimoji="1" lang="ko-KR" altLang="en-US" smtClean="0"/>
-              <a:t>2025. 7. 21.</a:t>
+              <a:t>2025. 7. 25.</a:t>
             </a:fld>
             <a:endParaRPr kumimoji="1" lang="ko-KR" altLang="en-US"/>
           </a:p>
@@ -2378,7 +2383,7 @@
           <a:p>
             <a:fld id="{BE516E25-678F-BC4C-A6D5-74022B6D308B}" type="datetimeFigureOut">
               <a:rPr kumimoji="1" lang="ko-KR" altLang="en-US" smtClean="0"/>
-              <a:t>2025. 7. 21.</a:t>
+              <a:t>2025. 7. 25.</a:t>
             </a:fld>
             <a:endParaRPr kumimoji="1" lang="ko-KR" altLang="en-US"/>
           </a:p>
@@ -2666,7 +2671,7 @@
           <a:p>
             <a:fld id="{BE516E25-678F-BC4C-A6D5-74022B6D308B}" type="datetimeFigureOut">
               <a:rPr kumimoji="1" lang="ko-KR" altLang="en-US" smtClean="0"/>
-              <a:t>2025. 7. 21.</a:t>
+              <a:t>2025. 7. 25.</a:t>
             </a:fld>
             <a:endParaRPr kumimoji="1" lang="ko-KR" altLang="en-US"/>
           </a:p>
@@ -2907,7 +2912,7 @@
           <a:p>
             <a:fld id="{BE516E25-678F-BC4C-A6D5-74022B6D308B}" type="datetimeFigureOut">
               <a:rPr kumimoji="1" lang="ko-KR" altLang="en-US" smtClean="0"/>
-              <a:t>2025. 7. 21.</a:t>
+              <a:t>2025. 7. 25.</a:t>
             </a:fld>
             <a:endParaRPr kumimoji="1" lang="ko-KR" altLang="en-US"/>
           </a:p>
@@ -4641,7 +4646,7 @@
         </p:blipFill>
         <p:spPr>
           <a:xfrm>
-            <a:off x="7711374" y="2622850"/>
+            <a:off x="6857433" y="2637784"/>
             <a:ext cx="804414" cy="1092086"/>
           </a:xfrm>
           <a:prstGeom prst="rect">
@@ -4671,7 +4676,7 @@
         </p:blipFill>
         <p:spPr>
           <a:xfrm>
-            <a:off x="9076045" y="2622850"/>
+            <a:off x="7962228" y="2637783"/>
             <a:ext cx="720123" cy="1092087"/>
           </a:xfrm>
           <a:prstGeom prst="rect">
@@ -4701,7 +4706,7 @@
         </p:blipFill>
         <p:spPr>
           <a:xfrm>
-            <a:off x="7711374" y="4160164"/>
+            <a:off x="7777381" y="4354328"/>
             <a:ext cx="2228805" cy="842221"/>
           </a:xfrm>
           <a:prstGeom prst="rect">
@@ -4948,6 +4953,36 @@
           <a:xfrm>
             <a:off x="3184732" y="4585117"/>
             <a:ext cx="1222349" cy="380644"/>
+          </a:xfrm>
+          <a:prstGeom prst="rect">
+            <a:avLst/>
+          </a:prstGeom>
+        </p:spPr>
+      </p:pic>
+      <p:pic>
+        <p:nvPicPr>
+          <p:cNvPr id="4" name="그림 3" descr="그래픽, 디자인이(가) 표시된 사진&#10;&#10;AI 생성 콘텐츠는 정확하지 않을 수 있습니다.">
+            <a:extLst>
+              <a:ext uri="{FF2B5EF4-FFF2-40B4-BE49-F238E27FC236}">
+                <a16:creationId xmlns:a16="http://schemas.microsoft.com/office/drawing/2014/main" id="{EEC59835-051A-090F-71E8-CB48F5B328BD}"/>
+              </a:ext>
+            </a:extLst>
+          </p:cNvPr>
+          <p:cNvPicPr>
+            <a:picLocks noChangeAspect="1"/>
+          </p:cNvPicPr>
+          <p:nvPr/>
+        </p:nvPicPr>
+        <p:blipFill>
+          <a:blip r:embed="rId8"/>
+          <a:stretch>
+            <a:fillRect/>
+          </a:stretch>
+        </p:blipFill>
+        <p:spPr>
+          <a:xfrm>
+            <a:off x="8982733" y="2624658"/>
+            <a:ext cx="1899760" cy="1166093"/>
           </a:xfrm>
           <a:prstGeom prst="rect">
             <a:avLst/>

</xml_diff>